<commit_message>
updated the jupyter notebook
</commit_message>
<xml_diff>
--- a/03 - Presentation/Digital Disparity - Draft presentation.pptx
+++ b/03 - Presentation/Digital Disparity - Draft presentation.pptx
@@ -273,7 +273,7 @@
           <a:p>
             <a:fld id="{D762E32F-5F27-499B-9DCA-6C60135BCA69}" type="datetimeFigureOut">
               <a:rPr lang="en-US" smtClean="0"/>
-              <a:t>6/6/2020</a:t>
+              <a:t>6/8/2020</a:t>
             </a:fld>
             <a:endParaRPr lang="en-US"/>
           </a:p>
@@ -471,7 +471,7 @@
           <a:p>
             <a:fld id="{D762E32F-5F27-499B-9DCA-6C60135BCA69}" type="datetimeFigureOut">
               <a:rPr lang="en-US" smtClean="0"/>
-              <a:t>6/6/2020</a:t>
+              <a:t>6/8/2020</a:t>
             </a:fld>
             <a:endParaRPr lang="en-US"/>
           </a:p>
@@ -679,7 +679,7 @@
           <a:p>
             <a:fld id="{D762E32F-5F27-499B-9DCA-6C60135BCA69}" type="datetimeFigureOut">
               <a:rPr lang="en-US" smtClean="0"/>
-              <a:t>6/6/2020</a:t>
+              <a:t>6/8/2020</a:t>
             </a:fld>
             <a:endParaRPr lang="en-US"/>
           </a:p>
@@ -908,7 +908,7 @@
           <a:p>
             <a:fld id="{02AC24A9-CCB6-4F8D-B8DB-C2F3692CFA5A}" type="datetimeFigureOut">
               <a:rPr lang="en-US" smtClean="0"/>
-              <a:t>6/6/2020</a:t>
+              <a:t>6/8/2020</a:t>
             </a:fld>
             <a:endParaRPr lang="en-US" dirty="0"/>
           </a:p>
@@ -1549,7 +1549,7 @@
           <a:p>
             <a:fld id="{02AC24A9-CCB6-4F8D-B8DB-C2F3692CFA5A}" type="datetimeFigureOut">
               <a:rPr lang="en-US" smtClean="0"/>
-              <a:t>6/6/2020</a:t>
+              <a:t>6/8/2020</a:t>
             </a:fld>
             <a:endParaRPr lang="en-US"/>
           </a:p>
@@ -2003,7 +2003,7 @@
           <a:p>
             <a:fld id="{02AC24A9-CCB6-4F8D-B8DB-C2F3692CFA5A}" type="datetimeFigureOut">
               <a:rPr lang="en-US" smtClean="0"/>
-              <a:t>6/6/2020</a:t>
+              <a:t>6/8/2020</a:t>
             </a:fld>
             <a:endParaRPr lang="en-US"/>
           </a:p>
@@ -2535,7 +2535,7 @@
           <a:p>
             <a:fld id="{02AC24A9-CCB6-4F8D-B8DB-C2F3692CFA5A}" type="datetimeFigureOut">
               <a:rPr lang="en-US" smtClean="0"/>
-              <a:t>6/6/2020</a:t>
+              <a:t>6/8/2020</a:t>
             </a:fld>
             <a:endParaRPr lang="en-US"/>
           </a:p>
@@ -3234,7 +3234,7 @@
           <a:p>
             <a:fld id="{02AC24A9-CCB6-4F8D-B8DB-C2F3692CFA5A}" type="datetimeFigureOut">
               <a:rPr lang="en-US" smtClean="0"/>
-              <a:t>6/6/2020</a:t>
+              <a:t>6/8/2020</a:t>
             </a:fld>
             <a:endParaRPr lang="en-US"/>
           </a:p>
@@ -3563,7 +3563,7 @@
           <a:p>
             <a:fld id="{02AC24A9-CCB6-4F8D-B8DB-C2F3692CFA5A}" type="datetimeFigureOut">
               <a:rPr lang="en-US" smtClean="0"/>
-              <a:t>6/6/2020</a:t>
+              <a:t>6/8/2020</a:t>
             </a:fld>
             <a:endParaRPr lang="en-US"/>
           </a:p>
@@ -3676,7 +3676,7 @@
           <a:p>
             <a:fld id="{02AC24A9-CCB6-4F8D-B8DB-C2F3692CFA5A}" type="datetimeFigureOut">
               <a:rPr lang="en-US" smtClean="0"/>
-              <a:t>6/6/2020</a:t>
+              <a:t>6/8/2020</a:t>
             </a:fld>
             <a:endParaRPr lang="en-US"/>
           </a:p>
@@ -4171,7 +4171,7 @@
           <a:p>
             <a:fld id="{02AC24A9-CCB6-4F8D-B8DB-C2F3692CFA5A}" type="datetimeFigureOut">
               <a:rPr lang="en-US" smtClean="0"/>
-              <a:t>6/6/2020</a:t>
+              <a:t>6/8/2020</a:t>
             </a:fld>
             <a:endParaRPr lang="en-US" dirty="0"/>
           </a:p>
@@ -4369,7 +4369,7 @@
           <a:p>
             <a:fld id="{D762E32F-5F27-499B-9DCA-6C60135BCA69}" type="datetimeFigureOut">
               <a:rPr lang="en-US" smtClean="0"/>
-              <a:t>6/6/2020</a:t>
+              <a:t>6/8/2020</a:t>
             </a:fld>
             <a:endParaRPr lang="en-US"/>
           </a:p>
@@ -4846,7 +4846,7 @@
           <a:p>
             <a:fld id="{02AC24A9-CCB6-4F8D-B8DB-C2F3692CFA5A}" type="datetimeFigureOut">
               <a:rPr lang="en-US" smtClean="0"/>
-              <a:t>6/6/2020</a:t>
+              <a:t>6/8/2020</a:t>
             </a:fld>
             <a:endParaRPr lang="en-US"/>
           </a:p>
@@ -5045,7 +5045,7 @@
           <a:p>
             <a:fld id="{02AC24A9-CCB6-4F8D-B8DB-C2F3692CFA5A}" type="datetimeFigureOut">
               <a:rPr lang="en-US" smtClean="0"/>
-              <a:t>6/6/2020</a:t>
+              <a:t>6/8/2020</a:t>
             </a:fld>
             <a:endParaRPr lang="en-US"/>
           </a:p>
@@ -5254,7 +5254,7 @@
           <a:p>
             <a:fld id="{02AC24A9-CCB6-4F8D-B8DB-C2F3692CFA5A}" type="datetimeFigureOut">
               <a:rPr lang="en-US" smtClean="0"/>
-              <a:t>6/6/2020</a:t>
+              <a:t>6/8/2020</a:t>
             </a:fld>
             <a:endParaRPr lang="en-US"/>
           </a:p>
@@ -5529,7 +5529,7 @@
           <a:p>
             <a:fld id="{D762E32F-5F27-499B-9DCA-6C60135BCA69}" type="datetimeFigureOut">
               <a:rPr lang="en-US" smtClean="0"/>
-              <a:t>6/6/2020</a:t>
+              <a:t>6/8/2020</a:t>
             </a:fld>
             <a:endParaRPr lang="en-US"/>
           </a:p>
@@ -5794,7 +5794,7 @@
           <a:p>
             <a:fld id="{D762E32F-5F27-499B-9DCA-6C60135BCA69}" type="datetimeFigureOut">
               <a:rPr lang="en-US" smtClean="0"/>
-              <a:t>6/6/2020</a:t>
+              <a:t>6/8/2020</a:t>
             </a:fld>
             <a:endParaRPr lang="en-US"/>
           </a:p>
@@ -6206,7 +6206,7 @@
           <a:p>
             <a:fld id="{D762E32F-5F27-499B-9DCA-6C60135BCA69}" type="datetimeFigureOut">
               <a:rPr lang="en-US" smtClean="0"/>
-              <a:t>6/6/2020</a:t>
+              <a:t>6/8/2020</a:t>
             </a:fld>
             <a:endParaRPr lang="en-US"/>
           </a:p>
@@ -6347,7 +6347,7 @@
           <a:p>
             <a:fld id="{D762E32F-5F27-499B-9DCA-6C60135BCA69}" type="datetimeFigureOut">
               <a:rPr lang="en-US" smtClean="0"/>
-              <a:t>6/6/2020</a:t>
+              <a:t>6/8/2020</a:t>
             </a:fld>
             <a:endParaRPr lang="en-US"/>
           </a:p>
@@ -6460,7 +6460,7 @@
           <a:p>
             <a:fld id="{D762E32F-5F27-499B-9DCA-6C60135BCA69}" type="datetimeFigureOut">
               <a:rPr lang="en-US" smtClean="0"/>
-              <a:t>6/6/2020</a:t>
+              <a:t>6/8/2020</a:t>
             </a:fld>
             <a:endParaRPr lang="en-US"/>
           </a:p>
@@ -6771,7 +6771,7 @@
           <a:p>
             <a:fld id="{D762E32F-5F27-499B-9DCA-6C60135BCA69}" type="datetimeFigureOut">
               <a:rPr lang="en-US" smtClean="0"/>
-              <a:t>6/6/2020</a:t>
+              <a:t>6/8/2020</a:t>
             </a:fld>
             <a:endParaRPr lang="en-US"/>
           </a:p>
@@ -7059,7 +7059,7 @@
           <a:p>
             <a:fld id="{D762E32F-5F27-499B-9DCA-6C60135BCA69}" type="datetimeFigureOut">
               <a:rPr lang="en-US" smtClean="0"/>
-              <a:t>6/6/2020</a:t>
+              <a:t>6/8/2020</a:t>
             </a:fld>
             <a:endParaRPr lang="en-US"/>
           </a:p>
@@ -7300,7 +7300,7 @@
           <a:p>
             <a:fld id="{D762E32F-5F27-499B-9DCA-6C60135BCA69}" type="datetimeFigureOut">
               <a:rPr lang="en-US" smtClean="0"/>
-              <a:t>6/6/2020</a:t>
+              <a:t>6/8/2020</a:t>
             </a:fld>
             <a:endParaRPr lang="en-US"/>
           </a:p>
@@ -7870,7 +7870,7 @@
           <a:p>
             <a:fld id="{02AC24A9-CCB6-4F8D-B8DB-C2F3692CFA5A}" type="datetimeFigureOut">
               <a:rPr lang="en-US" smtClean="0"/>
-              <a:t>6/6/2020</a:t>
+              <a:t>6/8/2020</a:t>
             </a:fld>
             <a:endParaRPr lang="en-US"/>
           </a:p>
@@ -10567,7 +10567,7 @@
               <a:pPr algn="ctr"/>
               <a:r>
                 <a:rPr lang="en-US" b="1" dirty="0"/>
-                <a:t>1. Extract</a:t>
+                <a:t>1. Web</a:t>
               </a:r>
               <a:endParaRPr lang="en-CA" b="1" dirty="0"/>
             </a:p>
@@ -10615,11 +10615,22 @@
               <a:pPr algn="ctr"/>
               <a:r>
                 <a:rPr lang="en-US" b="1" dirty="0"/>
-                <a:t>2. Transform (</a:t>
+                <a:t>2. Extract</a:t>
+              </a:r>
+            </a:p>
+            <a:p>
+              <a:pPr algn="ctr"/>
+              <a:r>
+                <a:rPr lang="en-US" b="1" dirty="0"/>
+                <a:t> (</a:t>
               </a:r>
               <a:r>
-                <a:rPr lang="en-US" b="1"/>
-                <a:t>Latyr)</a:t>
+                <a:rPr lang="en-US" b="1" dirty="0" err="1"/>
+                <a:t>Latyr</a:t>
+              </a:r>
+              <a:r>
+                <a:rPr lang="en-US" b="1" dirty="0"/>
+                <a:t>)</a:t>
               </a:r>
               <a:endParaRPr lang="en-CA" b="1" dirty="0"/>
             </a:p>
@@ -10950,7 +10961,7 @@
               <a:pPr algn="ctr"/>
               <a:r>
                 <a:rPr lang="en-US" b="1" dirty="0"/>
-                <a:t>3. Load/Analyze (</a:t>
+                <a:t>3. Transform/Load (</a:t>
               </a:r>
               <a:r>
                 <a:rPr lang="en-US" b="1" dirty="0">

</xml_diff>